<commit_message>
Added Sep 2nd Meeting Minutes
</commit_message>
<xml_diff>
--- a/proj_asic/docs/Senior Project PDR.pptx
+++ b/proj_asic/docs/Senior Project PDR.pptx
@@ -258,6 +258,11 @@
       </a:defRPr>
     </a:lvl9pPr>
   </p:defaultTextStyle>
+  <p:extLst>
+    <p:ext uri="{EFAFB233-063F-42B5-8137-9DF3F51BA10A}">
+      <p15:sldGuideLst xmlns:p15="http://schemas.microsoft.com/office/powerpoint/2012/main"/>
+    </p:ext>
+  </p:extLst>
 </p:presentation>
 </file>
 
@@ -18268,7 +18273,31 @@
                 <a:cs typeface="Times New Roman"/>
                 <a:sym typeface="Times New Roman"/>
               </a:rPr>
-              <a:t> is transferred from the i2s into a FIFO</a:t>
+              <a:t> </a:t>
+            </a:r>
+            <a:r>
+              <a:rPr lang="en-US" sz="2600" dirty="0" smtClean="0">
+                <a:solidFill>
+                  <a:schemeClr val="dk1"/>
+                </a:solidFill>
+                <a:latin typeface="Times New Roman"/>
+                <a:ea typeface="Times New Roman"/>
+                <a:cs typeface="Times New Roman"/>
+                <a:sym typeface="Times New Roman"/>
+              </a:rPr>
+              <a:t>are </a:t>
+            </a:r>
+            <a:r>
+              <a:rPr lang="en-US" sz="2600" dirty="0">
+                <a:solidFill>
+                  <a:schemeClr val="dk1"/>
+                </a:solidFill>
+                <a:latin typeface="Times New Roman"/>
+                <a:ea typeface="Times New Roman"/>
+                <a:cs typeface="Times New Roman"/>
+                <a:sym typeface="Times New Roman"/>
+              </a:rPr>
+              <a:t>transferred from the i2s into a FIFO</a:t>
             </a:r>
           </a:p>
           <a:p>
@@ -18388,7 +18417,43 @@
                 <a:cs typeface="Times New Roman"/>
                 <a:sym typeface="Times New Roman"/>
               </a:rPr>
-              <a:t>Data will be accumulated in with a precision of 40 bits</a:t>
+              <a:t>Data will be </a:t>
+            </a:r>
+            <a:r>
+              <a:rPr lang="en-US" sz="2600">
+                <a:solidFill>
+                  <a:schemeClr val="dk1"/>
+                </a:solidFill>
+                <a:latin typeface="Times New Roman"/>
+                <a:ea typeface="Times New Roman"/>
+                <a:cs typeface="Times New Roman"/>
+                <a:sym typeface="Times New Roman"/>
+              </a:rPr>
+              <a:t>accumulated </a:t>
+            </a:r>
+            <a:r>
+              <a:rPr lang="en-US" sz="2600" smtClean="0">
+                <a:solidFill>
+                  <a:schemeClr val="dk1"/>
+                </a:solidFill>
+                <a:latin typeface="Times New Roman"/>
+                <a:ea typeface="Times New Roman"/>
+                <a:cs typeface="Times New Roman"/>
+                <a:sym typeface="Times New Roman"/>
+              </a:rPr>
+              <a:t>with </a:t>
+            </a:r>
+            <a:r>
+              <a:rPr lang="en-US" sz="2600" dirty="0">
+                <a:solidFill>
+                  <a:schemeClr val="dk1"/>
+                </a:solidFill>
+                <a:latin typeface="Times New Roman"/>
+                <a:ea typeface="Times New Roman"/>
+                <a:cs typeface="Times New Roman"/>
+                <a:sym typeface="Times New Roman"/>
+              </a:rPr>
+              <a:t>a precision of 40 bits</a:t>
             </a:r>
           </a:p>
           <a:p>
@@ -19435,8 +19500,29 @@
                 <a:cs typeface="Times New Roman"/>
                 <a:sym typeface="Times New Roman"/>
               </a:rPr>
-              <a:t>Complete block documents</a:t>
-            </a:r>
+              <a:t>Complete block </a:t>
+            </a:r>
+            <a:r>
+              <a:rPr lang="en-US" sz="2800" dirty="0" smtClean="0">
+                <a:solidFill>
+                  <a:schemeClr val="dk1"/>
+                </a:solidFill>
+                <a:latin typeface="Times New Roman"/>
+                <a:ea typeface="Times New Roman"/>
+                <a:cs typeface="Times New Roman"/>
+                <a:sym typeface="Times New Roman"/>
+              </a:rPr>
+              <a:t>documents as soon as possible</a:t>
+            </a:r>
+            <a:endParaRPr lang="en-US" sz="2800" dirty="0">
+              <a:solidFill>
+                <a:schemeClr val="dk1"/>
+              </a:solidFill>
+              <a:latin typeface="Times New Roman"/>
+              <a:ea typeface="Times New Roman"/>
+              <a:cs typeface="Times New Roman"/>
+              <a:sym typeface="Times New Roman"/>
+            </a:endParaRPr>
           </a:p>
           <a:p>
             <a:pPr marL="1143000" lvl="1" indent="-457200">
@@ -19850,7 +19936,7 @@
               <a:t>Dhruvit</a:t>
             </a:r>
             <a:r>
-              <a:rPr lang="en-US" sz="2800" dirty="0">
+              <a:rPr lang="en-US" sz="2800" smtClean="0">
                 <a:latin typeface="Times New Roman"/>
                 <a:ea typeface="Times New Roman"/>
                 <a:cs typeface="Times New Roman"/>
@@ -19858,37 +19944,6 @@
               </a:rPr>
               <a:t>)</a:t>
             </a:r>
-          </a:p>
-          <a:p>
-            <a:pPr marL="685800" indent="-457200">
-              <a:spcBef>
-                <a:spcPts val="0"/>
-              </a:spcBef>
-            </a:pPr>
-            <a:r>
-              <a:rPr lang="en-US" sz="2800" dirty="0">
-                <a:latin typeface="Times New Roman"/>
-                <a:ea typeface="Times New Roman"/>
-                <a:cs typeface="Times New Roman"/>
-                <a:sym typeface="Times New Roman"/>
-              </a:rPr>
-              <a:t>Testing</a:t>
-            </a:r>
-          </a:p>
-          <a:p>
-            <a:pPr marL="342900" marR="0" lvl="0" indent="-342900" algn="l" rtl="0">
-              <a:spcBef>
-                <a:spcPts val="960"/>
-              </a:spcBef>
-              <a:spcAft>
-                <a:spcPts val="0"/>
-              </a:spcAft>
-              <a:buClr>
-                <a:schemeClr val="dk1"/>
-              </a:buClr>
-              <a:buFont typeface="Times New Roman"/>
-              <a:buNone/>
-            </a:pPr>
             <a:endParaRPr sz="2800" b="0" i="0" u="none" strike="noStrike" cap="none" baseline="0" dirty="0">
               <a:solidFill>
                 <a:schemeClr val="dk1"/>

</xml_diff>